<commit_message>
Fixes #3 - add .push and .replace slides to Vue Router
</commit_message>
<xml_diff>
--- a/Slides/4_Vue Router.pptx
+++ b/Slides/4_Vue Router.pptx
@@ -5,7 +5,7 @@
     <p:sldMasterId id="2147483648" r:id="rId1"/>
   </p:sldMasterIdLst>
   <p:notesMasterIdLst>
-    <p:notesMasterId r:id="rId13"/>
+    <p:notesMasterId r:id="rId15"/>
   </p:notesMasterIdLst>
   <p:sldIdLst>
     <p:sldId id="256" r:id="rId2"/>
@@ -18,7 +18,9 @@
     <p:sldId id="324" r:id="rId9"/>
     <p:sldId id="298" r:id="rId10"/>
     <p:sldId id="299" r:id="rId11"/>
-    <p:sldId id="322" r:id="rId12"/>
+    <p:sldId id="325" r:id="rId12"/>
+    <p:sldId id="326" r:id="rId13"/>
+    <p:sldId id="322" r:id="rId14"/>
   </p:sldIdLst>
   <p:sldSz cx="12192000" cy="6858000"/>
   <p:notesSz cx="6858000" cy="9144000"/>
@@ -207,7 +209,7 @@
           <a:p>
             <a:fld id="{FE0698A4-8696-4B25-BC16-7D62971AF3FD}" type="datetimeFigureOut">
               <a:rPr lang="en-US" smtClean="0"/>
-              <a:t>8/18/2021</a:t>
+              <a:t>9/14/2021</a:t>
             </a:fld>
             <a:endParaRPr lang="en-US"/>
           </a:p>
@@ -789,7 +791,7 @@
           <a:p>
             <a:fld id="{52B491D6-D58D-44B5-AD9D-0243D7ABB41E}" type="datetimeFigureOut">
               <a:rPr lang="en-US" smtClean="0"/>
-              <a:t>8/18/2021</a:t>
+              <a:t>9/14/2021</a:t>
             </a:fld>
             <a:endParaRPr lang="en-US"/>
           </a:p>
@@ -987,7 +989,7 @@
           <a:p>
             <a:fld id="{52B491D6-D58D-44B5-AD9D-0243D7ABB41E}" type="datetimeFigureOut">
               <a:rPr lang="en-US" smtClean="0"/>
-              <a:t>8/18/2021</a:t>
+              <a:t>9/14/2021</a:t>
             </a:fld>
             <a:endParaRPr lang="en-US"/>
           </a:p>
@@ -1195,7 +1197,7 @@
           <a:p>
             <a:fld id="{52B491D6-D58D-44B5-AD9D-0243D7ABB41E}" type="datetimeFigureOut">
               <a:rPr lang="en-US" smtClean="0"/>
-              <a:t>8/18/2021</a:t>
+              <a:t>9/14/2021</a:t>
             </a:fld>
             <a:endParaRPr lang="en-US"/>
           </a:p>
@@ -1518,7 +1520,7 @@
           <a:p>
             <a:fld id="{52B491D6-D58D-44B5-AD9D-0243D7ABB41E}" type="datetimeFigureOut">
               <a:rPr lang="en-US" smtClean="0"/>
-              <a:t>8/18/2021</a:t>
+              <a:t>9/14/2021</a:t>
             </a:fld>
             <a:endParaRPr lang="en-US"/>
           </a:p>
@@ -1793,7 +1795,7 @@
           <a:p>
             <a:fld id="{52B491D6-D58D-44B5-AD9D-0243D7ABB41E}" type="datetimeFigureOut">
               <a:rPr lang="en-US" smtClean="0"/>
-              <a:t>8/18/2021</a:t>
+              <a:t>9/14/2021</a:t>
             </a:fld>
             <a:endParaRPr lang="en-US"/>
           </a:p>
@@ -2058,7 +2060,7 @@
           <a:p>
             <a:fld id="{52B491D6-D58D-44B5-AD9D-0243D7ABB41E}" type="datetimeFigureOut">
               <a:rPr lang="en-US" smtClean="0"/>
-              <a:t>8/18/2021</a:t>
+              <a:t>9/14/2021</a:t>
             </a:fld>
             <a:endParaRPr lang="en-US"/>
           </a:p>
@@ -2470,7 +2472,7 @@
           <a:p>
             <a:fld id="{52B491D6-D58D-44B5-AD9D-0243D7ABB41E}" type="datetimeFigureOut">
               <a:rPr lang="en-US" smtClean="0"/>
-              <a:t>8/18/2021</a:t>
+              <a:t>9/14/2021</a:t>
             </a:fld>
             <a:endParaRPr lang="en-US"/>
           </a:p>
@@ -2611,7 +2613,7 @@
           <a:p>
             <a:fld id="{52B491D6-D58D-44B5-AD9D-0243D7ABB41E}" type="datetimeFigureOut">
               <a:rPr lang="en-US" smtClean="0"/>
-              <a:t>8/18/2021</a:t>
+              <a:t>9/14/2021</a:t>
             </a:fld>
             <a:endParaRPr lang="en-US"/>
           </a:p>
@@ -2724,7 +2726,7 @@
           <a:p>
             <a:fld id="{52B491D6-D58D-44B5-AD9D-0243D7ABB41E}" type="datetimeFigureOut">
               <a:rPr lang="en-US" smtClean="0"/>
-              <a:t>8/18/2021</a:t>
+              <a:t>9/14/2021</a:t>
             </a:fld>
             <a:endParaRPr lang="en-US"/>
           </a:p>
@@ -3035,7 +3037,7 @@
           <a:p>
             <a:fld id="{52B491D6-D58D-44B5-AD9D-0243D7ABB41E}" type="datetimeFigureOut">
               <a:rPr lang="en-US" smtClean="0"/>
-              <a:t>8/18/2021</a:t>
+              <a:t>9/14/2021</a:t>
             </a:fld>
             <a:endParaRPr lang="en-US"/>
           </a:p>
@@ -3323,7 +3325,7 @@
           <a:p>
             <a:fld id="{52B491D6-D58D-44B5-AD9D-0243D7ABB41E}" type="datetimeFigureOut">
               <a:rPr lang="en-US" smtClean="0"/>
-              <a:t>8/18/2021</a:t>
+              <a:t>9/14/2021</a:t>
             </a:fld>
             <a:endParaRPr lang="en-US"/>
           </a:p>
@@ -3564,7 +3566,7 @@
           <a:p>
             <a:fld id="{52B491D6-D58D-44B5-AD9D-0243D7ABB41E}" type="datetimeFigureOut">
               <a:rPr lang="en-US" smtClean="0"/>
-              <a:t>8/18/2021</a:t>
+              <a:t>9/14/2021</a:t>
             </a:fld>
             <a:endParaRPr lang="en-US"/>
           </a:p>
@@ -4136,6 +4138,190 @@
 </file>
 
 <file path=ppt/slides/slide11.xml><?xml version="1.0" encoding="utf-8"?>
+<p:sld xmlns:a="http://schemas.openxmlformats.org/drawingml/2006/main" xmlns:r="http://schemas.openxmlformats.org/officeDocument/2006/relationships" xmlns:p="http://schemas.openxmlformats.org/presentationml/2006/main">
+  <p:cSld>
+    <p:spTree>
+      <p:nvGrpSpPr>
+        <p:cNvPr id="1" name=""/>
+        <p:cNvGrpSpPr/>
+        <p:nvPr/>
+      </p:nvGrpSpPr>
+      <p:grpSpPr>
+        <a:xfrm>
+          <a:off x="0" y="0"/>
+          <a:ext cx="0" cy="0"/>
+          <a:chOff x="0" y="0"/>
+          <a:chExt cx="0" cy="0"/>
+        </a:xfrm>
+      </p:grpSpPr>
+      <p:sp>
+        <p:nvSpPr>
+          <p:cNvPr id="2" name="Title 1">
+            <a:extLst>
+              <a:ext uri="{FF2B5EF4-FFF2-40B4-BE49-F238E27FC236}">
+                <a16:creationId xmlns:a16="http://schemas.microsoft.com/office/drawing/2014/main" id="{FB737693-C10E-4B17-8378-CCF802FB8DB2}"/>
+              </a:ext>
+            </a:extLst>
+          </p:cNvPr>
+          <p:cNvSpPr>
+            <a:spLocks noGrp="1"/>
+          </p:cNvSpPr>
+          <p:nvPr>
+            <p:ph type="title"/>
+          </p:nvPr>
+        </p:nvSpPr>
+        <p:spPr/>
+        <p:txBody>
+          <a:bodyPr/>
+          <a:lstStyle/>
+          <a:p>
+            <a:r>
+              <a:rPr lang="en-US" dirty="0"/>
+              <a:t>Change Route </a:t>
+            </a:r>
+            <a:r>
+              <a:rPr lang="en-US" dirty="0" err="1"/>
+              <a:t>Programmically</a:t>
+            </a:r>
+            <a:endParaRPr lang="en-US" dirty="0"/>
+          </a:p>
+        </p:txBody>
+      </p:sp>
+      <p:pic>
+        <p:nvPicPr>
+          <p:cNvPr id="9" name="Content Placeholder 8">
+            <a:extLst>
+              <a:ext uri="{FF2B5EF4-FFF2-40B4-BE49-F238E27FC236}">
+                <a16:creationId xmlns:a16="http://schemas.microsoft.com/office/drawing/2014/main" id="{AC87C5DF-36E8-4D1E-A7E4-8B2F4D8CBCCB}"/>
+              </a:ext>
+            </a:extLst>
+          </p:cNvPr>
+          <p:cNvPicPr>
+            <a:picLocks noGrp="1" noChangeAspect="1"/>
+          </p:cNvPicPr>
+          <p:nvPr>
+            <p:ph idx="1"/>
+          </p:nvPr>
+        </p:nvPicPr>
+        <p:blipFill>
+          <a:blip r:embed="rId2"/>
+          <a:stretch>
+            <a:fillRect/>
+          </a:stretch>
+        </p:blipFill>
+        <p:spPr>
+          <a:xfrm>
+            <a:off x="838200" y="2132558"/>
+            <a:ext cx="10515600" cy="3737472"/>
+          </a:xfrm>
+        </p:spPr>
+      </p:pic>
+    </p:spTree>
+    <p:extLst>
+      <p:ext uri="{BB962C8B-B14F-4D97-AF65-F5344CB8AC3E}">
+        <p14:creationId xmlns:p14="http://schemas.microsoft.com/office/powerpoint/2010/main" val="3977245525"/>
+      </p:ext>
+    </p:extLst>
+  </p:cSld>
+  <p:clrMapOvr>
+    <a:masterClrMapping/>
+  </p:clrMapOvr>
+</p:sld>
+</file>
+
+<file path=ppt/slides/slide12.xml><?xml version="1.0" encoding="utf-8"?>
+<p:sld xmlns:a="http://schemas.openxmlformats.org/drawingml/2006/main" xmlns:r="http://schemas.openxmlformats.org/officeDocument/2006/relationships" xmlns:p="http://schemas.openxmlformats.org/presentationml/2006/main">
+  <p:cSld>
+    <p:spTree>
+      <p:nvGrpSpPr>
+        <p:cNvPr id="1" name=""/>
+        <p:cNvGrpSpPr/>
+        <p:nvPr/>
+      </p:nvGrpSpPr>
+      <p:grpSpPr>
+        <a:xfrm>
+          <a:off x="0" y="0"/>
+          <a:ext cx="0" cy="0"/>
+          <a:chOff x="0" y="0"/>
+          <a:chExt cx="0" cy="0"/>
+        </a:xfrm>
+      </p:grpSpPr>
+      <p:sp>
+        <p:nvSpPr>
+          <p:cNvPr id="2" name="Title 1">
+            <a:extLst>
+              <a:ext uri="{FF2B5EF4-FFF2-40B4-BE49-F238E27FC236}">
+                <a16:creationId xmlns:a16="http://schemas.microsoft.com/office/drawing/2014/main" id="{FB737693-C10E-4B17-8378-CCF802FB8DB2}"/>
+              </a:ext>
+            </a:extLst>
+          </p:cNvPr>
+          <p:cNvSpPr>
+            <a:spLocks noGrp="1"/>
+          </p:cNvSpPr>
+          <p:nvPr>
+            <p:ph type="title"/>
+          </p:nvPr>
+        </p:nvSpPr>
+        <p:spPr/>
+        <p:txBody>
+          <a:bodyPr/>
+          <a:lstStyle/>
+          <a:p>
+            <a:r>
+              <a:rPr lang="en-US" dirty="0"/>
+              <a:t>Change Route </a:t>
+            </a:r>
+            <a:r>
+              <a:rPr lang="en-US" dirty="0" err="1"/>
+              <a:t>Programmically</a:t>
+            </a:r>
+            <a:endParaRPr lang="en-US" dirty="0"/>
+          </a:p>
+        </p:txBody>
+      </p:sp>
+      <p:pic>
+        <p:nvPicPr>
+          <p:cNvPr id="7" name="Content Placeholder 6">
+            <a:extLst>
+              <a:ext uri="{FF2B5EF4-FFF2-40B4-BE49-F238E27FC236}">
+                <a16:creationId xmlns:a16="http://schemas.microsoft.com/office/drawing/2014/main" id="{EE26F9B2-E8DA-4A73-8D75-90660822485B}"/>
+              </a:ext>
+            </a:extLst>
+          </p:cNvPr>
+          <p:cNvPicPr>
+            <a:picLocks noGrp="1" noChangeAspect="1"/>
+          </p:cNvPicPr>
+          <p:nvPr>
+            <p:ph idx="1"/>
+          </p:nvPr>
+        </p:nvPicPr>
+        <p:blipFill>
+          <a:blip r:embed="rId2"/>
+          <a:stretch>
+            <a:fillRect/>
+          </a:stretch>
+        </p:blipFill>
+        <p:spPr>
+          <a:xfrm>
+            <a:off x="838200" y="2132558"/>
+            <a:ext cx="10515600" cy="3737472"/>
+          </a:xfrm>
+        </p:spPr>
+      </p:pic>
+    </p:spTree>
+    <p:extLst>
+      <p:ext uri="{BB962C8B-B14F-4D97-AF65-F5344CB8AC3E}">
+        <p14:creationId xmlns:p14="http://schemas.microsoft.com/office/powerpoint/2010/main" val="1934968480"/>
+      </p:ext>
+    </p:extLst>
+  </p:cSld>
+  <p:clrMapOvr>
+    <a:masterClrMapping/>
+  </p:clrMapOvr>
+</p:sld>
+</file>
+
+<file path=ppt/slides/slide13.xml><?xml version="1.0" encoding="utf-8"?>
 <p:sld xmlns:a="http://schemas.openxmlformats.org/drawingml/2006/main" xmlns:r="http://schemas.openxmlformats.org/officeDocument/2006/relationships" xmlns:p="http://schemas.openxmlformats.org/presentationml/2006/main">
   <p:cSld>
     <p:spTree>

</xml_diff>